<commit_message>
update until profiling part
</commit_message>
<xml_diff>
--- a/diagramas.pptx
+++ b/diagramas.pptx
@@ -6,6 +6,7 @@
   </p:sldMasterIdLst>
   <p:sldIdLst>
     <p:sldId id="256" r:id="rId2"/>
+    <p:sldId id="257" r:id="rId3"/>
   </p:sldIdLst>
   <p:sldSz cx="12192000" cy="6858000"/>
   <p:notesSz cx="6858000" cy="9144000"/>
@@ -104,6 +105,11 @@
       </a:defRPr>
     </a:lvl9pPr>
   </p:defaultTextStyle>
+  <p:extLst>
+    <p:ext uri="{EFAFB233-063F-42B5-8137-9DF3F51BA10A}">
+      <p15:sldGuideLst xmlns:p15="http://schemas.microsoft.com/office/powerpoint/2012/main"/>
+    </p:ext>
+  </p:extLst>
 </p:presentation>
 </file>
 
@@ -254,7 +260,7 @@
           <a:p>
             <a:fld id="{F83F93F0-21FB-4CDC-BA0D-4B5B63E5D255}" type="datetimeFigureOut">
               <a:rPr lang="en-US" smtClean="0"/>
-              <a:t>11/15/2024</a:t>
+              <a:t>11/17/2024</a:t>
             </a:fld>
             <a:endParaRPr lang="en-US"/>
           </a:p>
@@ -452,7 +458,7 @@
           <a:p>
             <a:fld id="{F83F93F0-21FB-4CDC-BA0D-4B5B63E5D255}" type="datetimeFigureOut">
               <a:rPr lang="en-US" smtClean="0"/>
-              <a:t>11/15/2024</a:t>
+              <a:t>11/17/2024</a:t>
             </a:fld>
             <a:endParaRPr lang="en-US"/>
           </a:p>
@@ -660,7 +666,7 @@
           <a:p>
             <a:fld id="{F83F93F0-21FB-4CDC-BA0D-4B5B63E5D255}" type="datetimeFigureOut">
               <a:rPr lang="en-US" smtClean="0"/>
-              <a:t>11/15/2024</a:t>
+              <a:t>11/17/2024</a:t>
             </a:fld>
             <a:endParaRPr lang="en-US"/>
           </a:p>
@@ -858,7 +864,7 @@
           <a:p>
             <a:fld id="{F83F93F0-21FB-4CDC-BA0D-4B5B63E5D255}" type="datetimeFigureOut">
               <a:rPr lang="en-US" smtClean="0"/>
-              <a:t>11/15/2024</a:t>
+              <a:t>11/17/2024</a:t>
             </a:fld>
             <a:endParaRPr lang="en-US"/>
           </a:p>
@@ -1133,7 +1139,7 @@
           <a:p>
             <a:fld id="{F83F93F0-21FB-4CDC-BA0D-4B5B63E5D255}" type="datetimeFigureOut">
               <a:rPr lang="en-US" smtClean="0"/>
-              <a:t>11/15/2024</a:t>
+              <a:t>11/17/2024</a:t>
             </a:fld>
             <a:endParaRPr lang="en-US"/>
           </a:p>
@@ -1398,7 +1404,7 @@
           <a:p>
             <a:fld id="{F83F93F0-21FB-4CDC-BA0D-4B5B63E5D255}" type="datetimeFigureOut">
               <a:rPr lang="en-US" smtClean="0"/>
-              <a:t>11/15/2024</a:t>
+              <a:t>11/17/2024</a:t>
             </a:fld>
             <a:endParaRPr lang="en-US"/>
           </a:p>
@@ -1810,7 +1816,7 @@
           <a:p>
             <a:fld id="{F83F93F0-21FB-4CDC-BA0D-4B5B63E5D255}" type="datetimeFigureOut">
               <a:rPr lang="en-US" smtClean="0"/>
-              <a:t>11/15/2024</a:t>
+              <a:t>11/17/2024</a:t>
             </a:fld>
             <a:endParaRPr lang="en-US"/>
           </a:p>
@@ -1951,7 +1957,7 @@
           <a:p>
             <a:fld id="{F83F93F0-21FB-4CDC-BA0D-4B5B63E5D255}" type="datetimeFigureOut">
               <a:rPr lang="en-US" smtClean="0"/>
-              <a:t>11/15/2024</a:t>
+              <a:t>11/17/2024</a:t>
             </a:fld>
             <a:endParaRPr lang="en-US"/>
           </a:p>
@@ -2064,7 +2070,7 @@
           <a:p>
             <a:fld id="{F83F93F0-21FB-4CDC-BA0D-4B5B63E5D255}" type="datetimeFigureOut">
               <a:rPr lang="en-US" smtClean="0"/>
-              <a:t>11/15/2024</a:t>
+              <a:t>11/17/2024</a:t>
             </a:fld>
             <a:endParaRPr lang="en-US"/>
           </a:p>
@@ -2375,7 +2381,7 @@
           <a:p>
             <a:fld id="{F83F93F0-21FB-4CDC-BA0D-4B5B63E5D255}" type="datetimeFigureOut">
               <a:rPr lang="en-US" smtClean="0"/>
-              <a:t>11/15/2024</a:t>
+              <a:t>11/17/2024</a:t>
             </a:fld>
             <a:endParaRPr lang="en-US"/>
           </a:p>
@@ -2663,7 +2669,7 @@
           <a:p>
             <a:fld id="{F83F93F0-21FB-4CDC-BA0D-4B5B63E5D255}" type="datetimeFigureOut">
               <a:rPr lang="en-US" smtClean="0"/>
-              <a:t>11/15/2024</a:t>
+              <a:t>11/17/2024</a:t>
             </a:fld>
             <a:endParaRPr lang="en-US"/>
           </a:p>
@@ -2904,7 +2910,7 @@
           <a:p>
             <a:fld id="{F83F93F0-21FB-4CDC-BA0D-4B5B63E5D255}" type="datetimeFigureOut">
               <a:rPr lang="en-US" smtClean="0"/>
-              <a:t>11/15/2024</a:t>
+              <a:t>11/17/2024</a:t>
             </a:fld>
             <a:endParaRPr lang="en-US"/>
           </a:p>
@@ -4099,6 +4105,451 @@
     <p:extLst>
       <p:ext uri="{BB962C8B-B14F-4D97-AF65-F5344CB8AC3E}">
         <p14:creationId xmlns:p14="http://schemas.microsoft.com/office/powerpoint/2010/main" val="3110100923"/>
+      </p:ext>
+    </p:extLst>
+  </p:cSld>
+  <p:clrMapOvr>
+    <a:masterClrMapping/>
+  </p:clrMapOvr>
+</p:sld>
+</file>
+
+<file path=ppt/slides/slide2.xml><?xml version="1.0" encoding="utf-8"?>
+<p:sld xmlns:a="http://schemas.openxmlformats.org/drawingml/2006/main" xmlns:r="http://schemas.openxmlformats.org/officeDocument/2006/relationships" xmlns:p="http://schemas.openxmlformats.org/presentationml/2006/main">
+  <p:cSld>
+    <p:spTree>
+      <p:nvGrpSpPr>
+        <p:cNvPr id="1" name=""/>
+        <p:cNvGrpSpPr/>
+        <p:nvPr/>
+      </p:nvGrpSpPr>
+      <p:grpSpPr>
+        <a:xfrm>
+          <a:off x="0" y="0"/>
+          <a:ext cx="0" cy="0"/>
+          <a:chOff x="0" y="0"/>
+          <a:chExt cx="0" cy="0"/>
+        </a:xfrm>
+      </p:grpSpPr>
+      <p:pic>
+        <p:nvPicPr>
+          <p:cNvPr id="8" name="Picture 7" descr="A close-up of a computer chip&#10;&#10;Description automatically generated">
+            <a:extLst>
+              <a:ext uri="{FF2B5EF4-FFF2-40B4-BE49-F238E27FC236}">
+                <a16:creationId xmlns:a16="http://schemas.microsoft.com/office/drawing/2014/main" id="{26526BF1-6EB2-976F-8AAC-4334DCE0D5FC}"/>
+              </a:ext>
+            </a:extLst>
+          </p:cNvPr>
+          <p:cNvPicPr>
+            <a:picLocks noChangeAspect="1"/>
+          </p:cNvPicPr>
+          <p:nvPr/>
+        </p:nvPicPr>
+        <p:blipFill>
+          <a:blip r:embed="rId2">
+            <a:extLst>
+              <a:ext uri="{28A0092B-C50C-407E-A947-70E740481C1C}">
+                <a14:useLocalDpi xmlns:a14="http://schemas.microsoft.com/office/drawing/2010/main" val="0"/>
+              </a:ext>
+              <a:ext uri="{837473B0-CC2E-450A-ABE3-18F120FF3D39}">
+                <a1611:picAttrSrcUrl xmlns:a1611="http://schemas.microsoft.com/office/drawing/2016/11/main" r:id="rId3"/>
+              </a:ext>
+            </a:extLst>
+          </a:blip>
+          <a:stretch>
+            <a:fillRect/>
+          </a:stretch>
+        </p:blipFill>
+        <p:spPr>
+          <a:xfrm>
+            <a:off x="579119" y="352425"/>
+            <a:ext cx="3043749" cy="2033778"/>
+          </a:xfrm>
+          <a:prstGeom prst="rect">
+            <a:avLst/>
+          </a:prstGeom>
+        </p:spPr>
+      </p:pic>
+      <p:pic>
+        <p:nvPicPr>
+          <p:cNvPr id="10" name="Picture 9" descr="A close-up of a computer chip&#10;&#10;Description automatically generated">
+            <a:extLst>
+              <a:ext uri="{FF2B5EF4-FFF2-40B4-BE49-F238E27FC236}">
+                <a16:creationId xmlns:a16="http://schemas.microsoft.com/office/drawing/2014/main" id="{9DE54D75-1C89-8BEB-AE32-0B09772DEF5E}"/>
+              </a:ext>
+            </a:extLst>
+          </p:cNvPr>
+          <p:cNvPicPr>
+            <a:picLocks noChangeAspect="1"/>
+          </p:cNvPicPr>
+          <p:nvPr/>
+        </p:nvPicPr>
+        <p:blipFill>
+          <a:blip r:embed="rId4">
+            <a:extLst>
+              <a:ext uri="{28A0092B-C50C-407E-A947-70E740481C1C}">
+                <a14:useLocalDpi xmlns:a14="http://schemas.microsoft.com/office/drawing/2010/main" val="0"/>
+              </a:ext>
+              <a:ext uri="{837473B0-CC2E-450A-ABE3-18F120FF3D39}">
+                <a1611:picAttrSrcUrl xmlns:a1611="http://schemas.microsoft.com/office/drawing/2016/11/main" r:id="rId5"/>
+              </a:ext>
+            </a:extLst>
+          </a:blip>
+          <a:stretch>
+            <a:fillRect/>
+          </a:stretch>
+        </p:blipFill>
+        <p:spPr>
+          <a:xfrm>
+            <a:off x="4766222" y="352425"/>
+            <a:ext cx="2659556" cy="2033778"/>
+          </a:xfrm>
+          <a:prstGeom prst="rect">
+            <a:avLst/>
+          </a:prstGeom>
+        </p:spPr>
+      </p:pic>
+      <p:pic>
+        <p:nvPicPr>
+          <p:cNvPr id="13" name="Picture 12" descr="A hard drive with a silver disk&#10;&#10;Description automatically generated">
+            <a:extLst>
+              <a:ext uri="{FF2B5EF4-FFF2-40B4-BE49-F238E27FC236}">
+                <a16:creationId xmlns:a16="http://schemas.microsoft.com/office/drawing/2014/main" id="{B1812C06-1B12-EA2D-0621-6A873FA5AE5B}"/>
+              </a:ext>
+            </a:extLst>
+          </p:cNvPr>
+          <p:cNvPicPr>
+            <a:picLocks noChangeAspect="1"/>
+          </p:cNvPicPr>
+          <p:nvPr/>
+        </p:nvPicPr>
+        <p:blipFill>
+          <a:blip r:embed="rId6">
+            <a:extLst>
+              <a:ext uri="{28A0092B-C50C-407E-A947-70E740481C1C}">
+                <a14:useLocalDpi xmlns:a14="http://schemas.microsoft.com/office/drawing/2010/main" val="0"/>
+              </a:ext>
+              <a:ext uri="{837473B0-CC2E-450A-ABE3-18F120FF3D39}">
+                <a1611:picAttrSrcUrl xmlns:a1611="http://schemas.microsoft.com/office/drawing/2016/11/main" r:id="rId7"/>
+              </a:ext>
+            </a:extLst>
+          </a:blip>
+          <a:stretch>
+            <a:fillRect/>
+          </a:stretch>
+        </p:blipFill>
+        <p:spPr>
+          <a:xfrm>
+            <a:off x="8881931" y="257175"/>
+            <a:ext cx="2730949" cy="2203923"/>
+          </a:xfrm>
+          <a:prstGeom prst="rect">
+            <a:avLst/>
+          </a:prstGeom>
+        </p:spPr>
+      </p:pic>
+      <p:sp>
+        <p:nvSpPr>
+          <p:cNvPr id="15" name="TextBox 14">
+            <a:extLst>
+              <a:ext uri="{FF2B5EF4-FFF2-40B4-BE49-F238E27FC236}">
+                <a16:creationId xmlns:a16="http://schemas.microsoft.com/office/drawing/2014/main" id="{FE7D595D-A46C-252F-C76F-9E52045C6AD4}"/>
+              </a:ext>
+            </a:extLst>
+          </p:cNvPr>
+          <p:cNvSpPr txBox="1"/>
+          <p:nvPr/>
+        </p:nvSpPr>
+        <p:spPr>
+          <a:xfrm>
+            <a:off x="758757" y="2461098"/>
+            <a:ext cx="2952603" cy="523220"/>
+          </a:xfrm>
+          <a:prstGeom prst="rect">
+            <a:avLst/>
+          </a:prstGeom>
+          <a:noFill/>
+        </p:spPr>
+        <p:txBody>
+          <a:bodyPr wrap="none" rtlCol="0">
+            <a:spAutoFit/>
+          </a:bodyPr>
+          <a:lstStyle/>
+          <a:p>
+            <a:r>
+              <a:rPr lang="es-PE" sz="2800" dirty="0"/>
+              <a:t>Procesador (CPU)</a:t>
+            </a:r>
+            <a:endParaRPr lang="en-US" sz="2800" dirty="0"/>
+          </a:p>
+        </p:txBody>
+      </p:sp>
+      <p:sp>
+        <p:nvSpPr>
+          <p:cNvPr id="16" name="TextBox 15">
+            <a:extLst>
+              <a:ext uri="{FF2B5EF4-FFF2-40B4-BE49-F238E27FC236}">
+                <a16:creationId xmlns:a16="http://schemas.microsoft.com/office/drawing/2014/main" id="{43C25710-B0E0-3F4F-F556-52790983A665}"/>
+              </a:ext>
+            </a:extLst>
+          </p:cNvPr>
+          <p:cNvSpPr txBox="1"/>
+          <p:nvPr/>
+        </p:nvSpPr>
+        <p:spPr>
+          <a:xfrm>
+            <a:off x="4872331" y="2461098"/>
+            <a:ext cx="2447338" cy="523220"/>
+          </a:xfrm>
+          <a:prstGeom prst="rect">
+            <a:avLst/>
+          </a:prstGeom>
+          <a:noFill/>
+        </p:spPr>
+        <p:txBody>
+          <a:bodyPr wrap="none" rtlCol="0">
+            <a:spAutoFit/>
+          </a:bodyPr>
+          <a:lstStyle/>
+          <a:p>
+            <a:pPr algn="ctr"/>
+            <a:r>
+              <a:rPr lang="es-PE" sz="2800" dirty="0"/>
+              <a:t>RAM (</a:t>
+            </a:r>
+            <a:r>
+              <a:rPr lang="es-PE" sz="2800" dirty="0" err="1"/>
+              <a:t>Memory</a:t>
+            </a:r>
+            <a:r>
+              <a:rPr lang="es-PE" sz="2800" dirty="0"/>
+              <a:t>)</a:t>
+            </a:r>
+            <a:endParaRPr lang="en-US" sz="2800" dirty="0"/>
+          </a:p>
+        </p:txBody>
+      </p:sp>
+      <p:sp>
+        <p:nvSpPr>
+          <p:cNvPr id="17" name="TextBox 16">
+            <a:extLst>
+              <a:ext uri="{FF2B5EF4-FFF2-40B4-BE49-F238E27FC236}">
+                <a16:creationId xmlns:a16="http://schemas.microsoft.com/office/drawing/2014/main" id="{78F5162F-E7DD-5CE0-EDD7-182AF84B297E}"/>
+              </a:ext>
+            </a:extLst>
+          </p:cNvPr>
+          <p:cNvSpPr txBox="1"/>
+          <p:nvPr/>
+        </p:nvSpPr>
+        <p:spPr>
+          <a:xfrm>
+            <a:off x="8976386" y="2461098"/>
+            <a:ext cx="2542043" cy="523220"/>
+          </a:xfrm>
+          <a:prstGeom prst="rect">
+            <a:avLst/>
+          </a:prstGeom>
+          <a:noFill/>
+        </p:spPr>
+        <p:txBody>
+          <a:bodyPr wrap="none" rtlCol="0">
+            <a:spAutoFit/>
+          </a:bodyPr>
+          <a:lstStyle/>
+          <a:p>
+            <a:pPr algn="ctr"/>
+            <a:r>
+              <a:rPr lang="es-PE" sz="2800" dirty="0"/>
+              <a:t>Disco (Storage)</a:t>
+            </a:r>
+            <a:endParaRPr lang="en-US" sz="2800" dirty="0"/>
+          </a:p>
+        </p:txBody>
+      </p:sp>
+      <p:sp>
+        <p:nvSpPr>
+          <p:cNvPr id="18" name="TextBox 17">
+            <a:extLst>
+              <a:ext uri="{FF2B5EF4-FFF2-40B4-BE49-F238E27FC236}">
+                <a16:creationId xmlns:a16="http://schemas.microsoft.com/office/drawing/2014/main" id="{58E795F8-C796-1D48-24B4-42C7651E95B2}"/>
+              </a:ext>
+            </a:extLst>
+          </p:cNvPr>
+          <p:cNvSpPr txBox="1"/>
+          <p:nvPr/>
+        </p:nvSpPr>
+        <p:spPr>
+          <a:xfrm>
+            <a:off x="832104" y="3182112"/>
+            <a:ext cx="2780056" cy="923330"/>
+          </a:xfrm>
+          <a:prstGeom prst="rect">
+            <a:avLst/>
+          </a:prstGeom>
+          <a:noFill/>
+        </p:spPr>
+        <p:txBody>
+          <a:bodyPr wrap="none" rtlCol="0">
+            <a:spAutoFit/>
+          </a:bodyPr>
+          <a:lstStyle/>
+          <a:p>
+            <a:pPr marL="285750" indent="-285750">
+              <a:buFont typeface="Arial" panose="020B0604020202020204" pitchFamily="34" charset="0"/>
+              <a:buChar char="•"/>
+            </a:pPr>
+            <a:r>
+              <a:rPr lang="es-PE" dirty="0"/>
+              <a:t>Hace cálculos</a:t>
+            </a:r>
+          </a:p>
+          <a:p>
+            <a:pPr marL="285750" indent="-285750">
+              <a:buFont typeface="Arial" panose="020B0604020202020204" pitchFamily="34" charset="0"/>
+              <a:buChar char="•"/>
+            </a:pPr>
+            <a:r>
+              <a:rPr lang="es-PE" dirty="0"/>
+              <a:t>Es muy rápido</a:t>
+            </a:r>
+          </a:p>
+          <a:p>
+            <a:pPr marL="285750" indent="-285750">
+              <a:buFont typeface="Arial" panose="020B0604020202020204" pitchFamily="34" charset="0"/>
+              <a:buChar char="•"/>
+            </a:pPr>
+            <a:r>
+              <a:rPr lang="es-PE" dirty="0"/>
+              <a:t>Puede ser muy costoso</a:t>
+            </a:r>
+            <a:endParaRPr lang="en-US" dirty="0"/>
+          </a:p>
+        </p:txBody>
+      </p:sp>
+      <p:sp>
+        <p:nvSpPr>
+          <p:cNvPr id="19" name="TextBox 18">
+            <a:extLst>
+              <a:ext uri="{FF2B5EF4-FFF2-40B4-BE49-F238E27FC236}">
+                <a16:creationId xmlns:a16="http://schemas.microsoft.com/office/drawing/2014/main" id="{007F458B-B479-8024-A9EE-7EB4122C886F}"/>
+              </a:ext>
+            </a:extLst>
+          </p:cNvPr>
+          <p:cNvSpPr txBox="1"/>
+          <p:nvPr/>
+        </p:nvSpPr>
+        <p:spPr>
+          <a:xfrm>
+            <a:off x="4698595" y="3182112"/>
+            <a:ext cx="3276859" cy="923330"/>
+          </a:xfrm>
+          <a:prstGeom prst="rect">
+            <a:avLst/>
+          </a:prstGeom>
+          <a:noFill/>
+        </p:spPr>
+        <p:txBody>
+          <a:bodyPr wrap="none" rtlCol="0">
+            <a:spAutoFit/>
+          </a:bodyPr>
+          <a:lstStyle/>
+          <a:p>
+            <a:pPr marL="285750" indent="-285750">
+              <a:buFont typeface="Arial" panose="020B0604020202020204" pitchFamily="34" charset="0"/>
+              <a:buChar char="•"/>
+            </a:pPr>
+            <a:r>
+              <a:rPr lang="es-PE" dirty="0"/>
+              <a:t>Almacena datos temporales</a:t>
+            </a:r>
+          </a:p>
+          <a:p>
+            <a:pPr marL="285750" indent="-285750">
+              <a:buFont typeface="Arial" panose="020B0604020202020204" pitchFamily="34" charset="0"/>
+              <a:buChar char="•"/>
+            </a:pPr>
+            <a:r>
+              <a:rPr lang="es-PE" dirty="0"/>
+              <a:t>Es rápida</a:t>
+            </a:r>
+          </a:p>
+          <a:p>
+            <a:pPr marL="285750" indent="-285750">
+              <a:buFont typeface="Arial" panose="020B0604020202020204" pitchFamily="34" charset="0"/>
+              <a:buChar char="•"/>
+            </a:pPr>
+            <a:r>
+              <a:rPr lang="es-PE" dirty="0"/>
+              <a:t>Es relativamente barato</a:t>
+            </a:r>
+            <a:endParaRPr lang="en-US" dirty="0"/>
+          </a:p>
+        </p:txBody>
+      </p:sp>
+      <p:sp>
+        <p:nvSpPr>
+          <p:cNvPr id="20" name="TextBox 19">
+            <a:extLst>
+              <a:ext uri="{FF2B5EF4-FFF2-40B4-BE49-F238E27FC236}">
+                <a16:creationId xmlns:a16="http://schemas.microsoft.com/office/drawing/2014/main" id="{6D3647BE-DAC2-90B4-C5EC-B481809AEFCE}"/>
+              </a:ext>
+            </a:extLst>
+          </p:cNvPr>
+          <p:cNvSpPr txBox="1"/>
+          <p:nvPr/>
+        </p:nvSpPr>
+        <p:spPr>
+          <a:xfrm>
+            <a:off x="8510968" y="3182112"/>
+            <a:ext cx="3472874" cy="923330"/>
+          </a:xfrm>
+          <a:prstGeom prst="rect">
+            <a:avLst/>
+          </a:prstGeom>
+          <a:noFill/>
+        </p:spPr>
+        <p:txBody>
+          <a:bodyPr wrap="none" rtlCol="0">
+            <a:spAutoFit/>
+          </a:bodyPr>
+          <a:lstStyle/>
+          <a:p>
+            <a:pPr marL="285750" indent="-285750">
+              <a:buFont typeface="Arial" panose="020B0604020202020204" pitchFamily="34" charset="0"/>
+              <a:buChar char="•"/>
+            </a:pPr>
+            <a:r>
+              <a:rPr lang="es-PE" dirty="0"/>
+              <a:t>Almacena datos permanentes</a:t>
+            </a:r>
+          </a:p>
+          <a:p>
+            <a:pPr marL="285750" indent="-285750">
+              <a:buFont typeface="Arial" panose="020B0604020202020204" pitchFamily="34" charset="0"/>
+              <a:buChar char="•"/>
+            </a:pPr>
+            <a:r>
+              <a:rPr lang="es-PE" dirty="0"/>
+              <a:t>Es lento</a:t>
+            </a:r>
+          </a:p>
+          <a:p>
+            <a:pPr marL="285750" indent="-285750">
+              <a:buFont typeface="Arial" panose="020B0604020202020204" pitchFamily="34" charset="0"/>
+              <a:buChar char="•"/>
+            </a:pPr>
+            <a:r>
+              <a:rPr lang="es-PE" dirty="0"/>
+              <a:t>Puede ser muy barato</a:t>
+            </a:r>
+            <a:endParaRPr lang="en-US" dirty="0"/>
+          </a:p>
+        </p:txBody>
+      </p:sp>
+    </p:spTree>
+    <p:extLst>
+      <p:ext uri="{BB962C8B-B14F-4D97-AF65-F5344CB8AC3E}">
+        <p14:creationId xmlns:p14="http://schemas.microsoft.com/office/powerpoint/2010/main" val="3738165858"/>
       </p:ext>
     </p:extLst>
   </p:cSld>

</xml_diff>